<commit_message>
Added Hexapod matlab fixes and new GUI
</commit_message>
<xml_diff>
--- a/app-gui/GUI2.pptx
+++ b/app-gui/GUI2.pptx
@@ -104,6 +104,11 @@
       </a:defRPr>
     </a:lvl9pPr>
   </p:defaultTextStyle>
+  <p:extLst>
+    <p:ext uri="{EFAFB233-063F-42B5-8137-9DF3F51BA10A}">
+      <p15:sldGuideLst xmlns:p15="http://schemas.microsoft.com/office/powerpoint/2012/main"/>
+    </p:ext>
+  </p:extLst>
 </p:presentation>
 </file>
 
@@ -238,7 +243,7 @@
           <a:p>
             <a:fld id="{96326712-ACCD-4F2C-912A-55B82750116F}" type="datetimeFigureOut">
               <a:rPr lang="en-US" smtClean="0"/>
-              <a:t>3/19/2024</a:t>
+              <a:t>4/18/2024</a:t>
             </a:fld>
             <a:endParaRPr lang="en-US"/>
           </a:p>
@@ -408,7 +413,7 @@
           <a:p>
             <a:fld id="{96326712-ACCD-4F2C-912A-55B82750116F}" type="datetimeFigureOut">
               <a:rPr lang="en-US" smtClean="0"/>
-              <a:t>3/19/2024</a:t>
+              <a:t>4/18/2024</a:t>
             </a:fld>
             <a:endParaRPr lang="en-US"/>
           </a:p>
@@ -588,7 +593,7 @@
           <a:p>
             <a:fld id="{96326712-ACCD-4F2C-912A-55B82750116F}" type="datetimeFigureOut">
               <a:rPr lang="en-US" smtClean="0"/>
-              <a:t>3/19/2024</a:t>
+              <a:t>4/18/2024</a:t>
             </a:fld>
             <a:endParaRPr lang="en-US"/>
           </a:p>
@@ -758,7 +763,7 @@
           <a:p>
             <a:fld id="{96326712-ACCD-4F2C-912A-55B82750116F}" type="datetimeFigureOut">
               <a:rPr lang="en-US" smtClean="0"/>
-              <a:t>3/19/2024</a:t>
+              <a:t>4/18/2024</a:t>
             </a:fld>
             <a:endParaRPr lang="en-US"/>
           </a:p>
@@ -1004,7 +1009,7 @@
           <a:p>
             <a:fld id="{96326712-ACCD-4F2C-912A-55B82750116F}" type="datetimeFigureOut">
               <a:rPr lang="en-US" smtClean="0"/>
-              <a:t>3/19/2024</a:t>
+              <a:t>4/18/2024</a:t>
             </a:fld>
             <a:endParaRPr lang="en-US"/>
           </a:p>
@@ -1236,7 +1241,7 @@
           <a:p>
             <a:fld id="{96326712-ACCD-4F2C-912A-55B82750116F}" type="datetimeFigureOut">
               <a:rPr lang="en-US" smtClean="0"/>
-              <a:t>3/19/2024</a:t>
+              <a:t>4/18/2024</a:t>
             </a:fld>
             <a:endParaRPr lang="en-US"/>
           </a:p>
@@ -1603,7 +1608,7 @@
           <a:p>
             <a:fld id="{96326712-ACCD-4F2C-912A-55B82750116F}" type="datetimeFigureOut">
               <a:rPr lang="en-US" smtClean="0"/>
-              <a:t>3/19/2024</a:t>
+              <a:t>4/18/2024</a:t>
             </a:fld>
             <a:endParaRPr lang="en-US"/>
           </a:p>
@@ -1721,7 +1726,7 @@
           <a:p>
             <a:fld id="{96326712-ACCD-4F2C-912A-55B82750116F}" type="datetimeFigureOut">
               <a:rPr lang="en-US" smtClean="0"/>
-              <a:t>3/19/2024</a:t>
+              <a:t>4/18/2024</a:t>
             </a:fld>
             <a:endParaRPr lang="en-US"/>
           </a:p>
@@ -1816,7 +1821,7 @@
           <a:p>
             <a:fld id="{96326712-ACCD-4F2C-912A-55B82750116F}" type="datetimeFigureOut">
               <a:rPr lang="en-US" smtClean="0"/>
-              <a:t>3/19/2024</a:t>
+              <a:t>4/18/2024</a:t>
             </a:fld>
             <a:endParaRPr lang="en-US"/>
           </a:p>
@@ -2093,7 +2098,7 @@
           <a:p>
             <a:fld id="{96326712-ACCD-4F2C-912A-55B82750116F}" type="datetimeFigureOut">
               <a:rPr lang="en-US" smtClean="0"/>
-              <a:t>3/19/2024</a:t>
+              <a:t>4/18/2024</a:t>
             </a:fld>
             <a:endParaRPr lang="en-US"/>
           </a:p>
@@ -2350,7 +2355,7 @@
           <a:p>
             <a:fld id="{96326712-ACCD-4F2C-912A-55B82750116F}" type="datetimeFigureOut">
               <a:rPr lang="en-US" smtClean="0"/>
-              <a:t>3/19/2024</a:t>
+              <a:t>4/18/2024</a:t>
             </a:fld>
             <a:endParaRPr lang="en-US"/>
           </a:p>
@@ -2563,7 +2568,7 @@
           <a:p>
             <a:fld id="{96326712-ACCD-4F2C-912A-55B82750116F}" type="datetimeFigureOut">
               <a:rPr lang="en-US" smtClean="0"/>
-              <a:t>3/19/2024</a:t>
+              <a:t>4/18/2024</a:t>
             </a:fld>
             <a:endParaRPr lang="en-US"/>
           </a:p>
@@ -3012,7 +3017,7 @@
         </p:nvSpPr>
         <p:spPr>
           <a:xfrm>
-            <a:off x="276103" y="329541"/>
+            <a:off x="247227" y="285874"/>
             <a:ext cx="5112326" cy="783771"/>
           </a:xfrm>
           <a:prstGeom prst="rect">
@@ -3046,13 +3051,13 @@
           <a:p>
             <a:pPr algn="ctr"/>
             <a:r>
-              <a:rPr lang="en-US" sz="2400" b="1" spc="900" dirty="0">
+              <a:rPr lang="en-US" sz="2000" b="1" spc="900" dirty="0">
                 <a:solidFill>
                   <a:schemeClr val="tx1"/>
                 </a:solidFill>
                 <a:latin typeface="Aptos Light" panose="020F0502020204030204" pitchFamily="34" charset="0"/>
               </a:rPr>
-              <a:t>DATA  COMPARISON</a:t>
+              <a:t>HEXA-TRACK FEEDBACK</a:t>
             </a:r>
           </a:p>
         </p:txBody>
@@ -3071,7 +3076,7 @@
         </p:nvSpPr>
         <p:spPr>
           <a:xfrm>
-            <a:off x="5791076" y="329541"/>
+            <a:off x="5762200" y="285874"/>
             <a:ext cx="2409950" cy="783771"/>
           </a:xfrm>
           <a:prstGeom prst="roundRect">
@@ -3104,639 +3109,14 @@
           <a:lstStyle/>
           <a:p>
             <a:pPr algn="ctr"/>
-            <a:endParaRPr lang="en-US" sz="1350" b="1" spc="900" dirty="0">
-              <a:solidFill>
-                <a:schemeClr val="tx1"/>
-              </a:solidFill>
-              <a:latin typeface="Aptos Light" panose="020F0502020204030204" pitchFamily="34" charset="0"/>
-            </a:endParaRPr>
-          </a:p>
-        </p:txBody>
-      </p:sp>
-      <p:grpSp>
-        <p:nvGrpSpPr>
-          <p:cNvPr id="26" name="Group 25">
-            <a:extLst>
-              <a:ext uri="{FF2B5EF4-FFF2-40B4-BE49-F238E27FC236}">
-                <a16:creationId xmlns:a16="http://schemas.microsoft.com/office/drawing/2014/main" id="{81D3CBDA-EDD9-EBD4-76BB-44BA6818CCD9}"/>
-              </a:ext>
-            </a:extLst>
-          </p:cNvPr>
-          <p:cNvGrpSpPr/>
-          <p:nvPr/>
-        </p:nvGrpSpPr>
-        <p:grpSpPr>
-          <a:xfrm>
-            <a:off x="478601" y="6154372"/>
-            <a:ext cx="6934325" cy="3747548"/>
-            <a:chOff x="2786000" y="1995151"/>
-            <a:chExt cx="4622883" cy="2498365"/>
-          </a:xfrm>
-        </p:grpSpPr>
-        <p:sp>
-          <p:nvSpPr>
-            <p:cNvPr id="23" name="Rectangle 22">
-              <a:extLst>
-                <a:ext uri="{FF2B5EF4-FFF2-40B4-BE49-F238E27FC236}">
-                  <a16:creationId xmlns:a16="http://schemas.microsoft.com/office/drawing/2014/main" id="{1B80D9EE-7564-B364-E8DF-8C90EC87CDF8}"/>
-                </a:ext>
-              </a:extLst>
-            </p:cNvPr>
-            <p:cNvSpPr/>
-            <p:nvPr/>
-          </p:nvSpPr>
-          <p:spPr>
-            <a:xfrm>
-              <a:off x="2789217" y="2364483"/>
-              <a:ext cx="4619666" cy="2129033"/>
-            </a:xfrm>
-            <a:prstGeom prst="rect">
-              <a:avLst/>
-            </a:prstGeom>
-            <a:solidFill>
-              <a:schemeClr val="bg1"/>
-            </a:solidFill>
-          </p:spPr>
-          <p:style>
-            <a:lnRef idx="2">
-              <a:schemeClr val="accent1">
-                <a:shade val="15000"/>
-              </a:schemeClr>
-            </a:lnRef>
-            <a:fillRef idx="1">
-              <a:schemeClr val="accent1"/>
-            </a:fillRef>
-            <a:effectRef idx="0">
-              <a:schemeClr val="accent1"/>
-            </a:effectRef>
-            <a:fontRef idx="minor">
-              <a:schemeClr val="lt1"/>
-            </a:fontRef>
-          </p:style>
-          <p:txBody>
-            <a:bodyPr rtlCol="0" anchor="ctr"/>
-            <a:lstStyle/>
-            <a:p>
-              <a:endParaRPr lang="en-US" sz="4050" b="1" dirty="0">
+            <a:r>
+              <a:rPr lang="en-US" sz="1350" b="1" dirty="0">
                 <a:solidFill>
                   <a:schemeClr val="tx1"/>
                 </a:solidFill>
                 <a:latin typeface="Aptos Light" panose="020F0502020204030204" pitchFamily="34" charset="0"/>
-              </a:endParaRPr>
-            </a:p>
-          </p:txBody>
-        </p:sp>
-        <p:sp>
-          <p:nvSpPr>
-            <p:cNvPr id="25" name="TextBox 24">
-              <a:extLst>
-                <a:ext uri="{FF2B5EF4-FFF2-40B4-BE49-F238E27FC236}">
-                  <a16:creationId xmlns:a16="http://schemas.microsoft.com/office/drawing/2014/main" id="{3DE81F31-8AF9-7B71-A55B-7462A4D54A5B}"/>
-                </a:ext>
-              </a:extLst>
-            </p:cNvPr>
-            <p:cNvSpPr txBox="1"/>
-            <p:nvPr/>
-          </p:nvSpPr>
-          <p:spPr>
-            <a:xfrm>
-              <a:off x="2786000" y="1995151"/>
-              <a:ext cx="1790700" cy="348813"/>
-            </a:xfrm>
-            <a:prstGeom prst="rect">
-              <a:avLst/>
-            </a:prstGeom>
-            <a:noFill/>
-          </p:spPr>
-          <p:txBody>
-            <a:bodyPr wrap="square" rtlCol="0">
-              <a:spAutoFit/>
-            </a:bodyPr>
-            <a:lstStyle/>
-            <a:p>
-              <a:r>
-                <a:rPr lang="en-US" sz="2800" u="sng" dirty="0">
-                  <a:solidFill>
-                    <a:schemeClr val="bg1">
-                      <a:lumMod val="95000"/>
-                    </a:schemeClr>
-                  </a:solidFill>
-                  <a:latin typeface="Aptos Light" panose="020B0004020202020204" pitchFamily="34" charset="0"/>
-                  <a:cs typeface="Kigelia Arabic Light" panose="020F0502020204030204" pitchFamily="34" charset="-78"/>
-                </a:rPr>
-                <a:t>Euler Angles</a:t>
-              </a:r>
-            </a:p>
-          </p:txBody>
-        </p:sp>
-      </p:grpSp>
-      <p:grpSp>
-        <p:nvGrpSpPr>
-          <p:cNvPr id="33" name="Group 32">
-            <a:extLst>
-              <a:ext uri="{FF2B5EF4-FFF2-40B4-BE49-F238E27FC236}">
-                <a16:creationId xmlns:a16="http://schemas.microsoft.com/office/drawing/2014/main" id="{81528EF7-A9C8-48B4-89DD-A41F4E5599A1}"/>
-              </a:ext>
-            </a:extLst>
-          </p:cNvPr>
-          <p:cNvGrpSpPr/>
-          <p:nvPr/>
-        </p:nvGrpSpPr>
-        <p:grpSpPr>
-          <a:xfrm>
-            <a:off x="10870250" y="6154372"/>
-            <a:ext cx="6934325" cy="3747548"/>
-            <a:chOff x="2786000" y="1995151"/>
-            <a:chExt cx="4622883" cy="2498365"/>
-          </a:xfrm>
-        </p:grpSpPr>
-        <p:sp>
-          <p:nvSpPr>
-            <p:cNvPr id="34" name="Rectangle 33">
-              <a:extLst>
-                <a:ext uri="{FF2B5EF4-FFF2-40B4-BE49-F238E27FC236}">
-                  <a16:creationId xmlns:a16="http://schemas.microsoft.com/office/drawing/2014/main" id="{98A5C14C-91F0-3BE2-B3C9-1EAAD8F99D44}"/>
-                </a:ext>
-              </a:extLst>
-            </p:cNvPr>
-            <p:cNvSpPr/>
-            <p:nvPr/>
-          </p:nvSpPr>
-          <p:spPr>
-            <a:xfrm>
-              <a:off x="2789217" y="2364483"/>
-              <a:ext cx="4619666" cy="2129033"/>
-            </a:xfrm>
-            <a:prstGeom prst="rect">
-              <a:avLst/>
-            </a:prstGeom>
-            <a:solidFill>
-              <a:schemeClr val="bg1"/>
-            </a:solidFill>
-          </p:spPr>
-          <p:style>
-            <a:lnRef idx="2">
-              <a:schemeClr val="accent1">
-                <a:shade val="15000"/>
-              </a:schemeClr>
-            </a:lnRef>
-            <a:fillRef idx="1">
-              <a:schemeClr val="accent1"/>
-            </a:fillRef>
-            <a:effectRef idx="0">
-              <a:schemeClr val="accent1"/>
-            </a:effectRef>
-            <a:fontRef idx="minor">
-              <a:schemeClr val="lt1"/>
-            </a:fontRef>
-          </p:style>
-          <p:txBody>
-            <a:bodyPr rtlCol="0" anchor="ctr"/>
-            <a:lstStyle/>
-            <a:p>
-              <a:endParaRPr lang="en-US" sz="4050" b="1" dirty="0">
-                <a:solidFill>
-                  <a:schemeClr val="tx1"/>
-                </a:solidFill>
-                <a:latin typeface="Aptos Light" panose="020F0502020204030204" pitchFamily="34" charset="0"/>
-              </a:endParaRPr>
-            </a:p>
-          </p:txBody>
-        </p:sp>
-        <p:sp>
-          <p:nvSpPr>
-            <p:cNvPr id="35" name="TextBox 34">
-              <a:extLst>
-                <a:ext uri="{FF2B5EF4-FFF2-40B4-BE49-F238E27FC236}">
-                  <a16:creationId xmlns:a16="http://schemas.microsoft.com/office/drawing/2014/main" id="{A8E3D89A-812A-8D34-A03E-0A347A043484}"/>
-                </a:ext>
-              </a:extLst>
-            </p:cNvPr>
-            <p:cNvSpPr txBox="1"/>
-            <p:nvPr/>
-          </p:nvSpPr>
-          <p:spPr>
-            <a:xfrm>
-              <a:off x="2786000" y="1995151"/>
-              <a:ext cx="1790700" cy="348813"/>
-            </a:xfrm>
-            <a:prstGeom prst="rect">
-              <a:avLst/>
-            </a:prstGeom>
-            <a:noFill/>
-          </p:spPr>
-          <p:txBody>
-            <a:bodyPr wrap="square" rtlCol="0">
-              <a:spAutoFit/>
-            </a:bodyPr>
-            <a:lstStyle/>
-            <a:p>
-              <a:r>
-                <a:rPr lang="en-US" sz="2800" u="sng" dirty="0">
-                  <a:solidFill>
-                    <a:schemeClr val="bg1">
-                      <a:lumMod val="95000"/>
-                    </a:schemeClr>
-                  </a:solidFill>
-                  <a:latin typeface="Aptos Light" panose="020B0004020202020204" pitchFamily="34" charset="0"/>
-                  <a:cs typeface="Kigelia Arabic Light" panose="020F0502020204030204" pitchFamily="34" charset="-78"/>
-                </a:rPr>
-                <a:t>Euler Angles</a:t>
-              </a:r>
-            </a:p>
-          </p:txBody>
-        </p:sp>
-      </p:grpSp>
-      <p:grpSp>
-        <p:nvGrpSpPr>
-          <p:cNvPr id="36" name="Group 35">
-            <a:extLst>
-              <a:ext uri="{FF2B5EF4-FFF2-40B4-BE49-F238E27FC236}">
-                <a16:creationId xmlns:a16="http://schemas.microsoft.com/office/drawing/2014/main" id="{0634648C-CBEB-9158-06A0-D32A88E41C16}"/>
-              </a:ext>
-            </a:extLst>
-          </p:cNvPr>
-          <p:cNvGrpSpPr/>
-          <p:nvPr/>
-        </p:nvGrpSpPr>
-        <p:grpSpPr>
-          <a:xfrm>
-            <a:off x="481013" y="2258855"/>
-            <a:ext cx="6934325" cy="3747548"/>
-            <a:chOff x="2786000" y="1995151"/>
-            <a:chExt cx="4622883" cy="2498365"/>
-          </a:xfrm>
-        </p:grpSpPr>
-        <p:sp>
-          <p:nvSpPr>
-            <p:cNvPr id="37" name="Rectangle 36">
-              <a:extLst>
-                <a:ext uri="{FF2B5EF4-FFF2-40B4-BE49-F238E27FC236}">
-                  <a16:creationId xmlns:a16="http://schemas.microsoft.com/office/drawing/2014/main" id="{9E512C58-0106-DA1F-2201-2B29B6B94074}"/>
-                </a:ext>
-              </a:extLst>
-            </p:cNvPr>
-            <p:cNvSpPr/>
-            <p:nvPr/>
-          </p:nvSpPr>
-          <p:spPr>
-            <a:xfrm>
-              <a:off x="2789217" y="2364483"/>
-              <a:ext cx="4619666" cy="2129033"/>
-            </a:xfrm>
-            <a:prstGeom prst="rect">
-              <a:avLst/>
-            </a:prstGeom>
-            <a:solidFill>
-              <a:schemeClr val="bg1"/>
-            </a:solidFill>
-          </p:spPr>
-          <p:style>
-            <a:lnRef idx="2">
-              <a:schemeClr val="accent1">
-                <a:shade val="15000"/>
-              </a:schemeClr>
-            </a:lnRef>
-            <a:fillRef idx="1">
-              <a:schemeClr val="accent1"/>
-            </a:fillRef>
-            <a:effectRef idx="0">
-              <a:schemeClr val="accent1"/>
-            </a:effectRef>
-            <a:fontRef idx="minor">
-              <a:schemeClr val="lt1"/>
-            </a:fontRef>
-          </p:style>
-          <p:txBody>
-            <a:bodyPr rtlCol="0" anchor="ctr"/>
-            <a:lstStyle/>
-            <a:p>
-              <a:endParaRPr lang="en-US" sz="4050" b="1" dirty="0">
-                <a:solidFill>
-                  <a:schemeClr val="tx1"/>
-                </a:solidFill>
-                <a:latin typeface="Aptos Light" panose="020F0502020204030204" pitchFamily="34" charset="0"/>
-              </a:endParaRPr>
-            </a:p>
-          </p:txBody>
-        </p:sp>
-        <p:sp>
-          <p:nvSpPr>
-            <p:cNvPr id="38" name="TextBox 37">
-              <a:extLst>
-                <a:ext uri="{FF2B5EF4-FFF2-40B4-BE49-F238E27FC236}">
-                  <a16:creationId xmlns:a16="http://schemas.microsoft.com/office/drawing/2014/main" id="{D5F6E11C-14EC-183C-AFC8-5E376A3062F8}"/>
-                </a:ext>
-              </a:extLst>
-            </p:cNvPr>
-            <p:cNvSpPr txBox="1"/>
-            <p:nvPr/>
-          </p:nvSpPr>
-          <p:spPr>
-            <a:xfrm>
-              <a:off x="2786000" y="1995151"/>
-              <a:ext cx="1790700" cy="348813"/>
-            </a:xfrm>
-            <a:prstGeom prst="rect">
-              <a:avLst/>
-            </a:prstGeom>
-            <a:noFill/>
-          </p:spPr>
-          <p:txBody>
-            <a:bodyPr wrap="square" rtlCol="0">
-              <a:spAutoFit/>
-            </a:bodyPr>
-            <a:lstStyle/>
-            <a:p>
-              <a:r>
-                <a:rPr lang="en-US" sz="2800" u="sng" dirty="0">
-                  <a:solidFill>
-                    <a:schemeClr val="bg1">
-                      <a:lumMod val="95000"/>
-                    </a:schemeClr>
-                  </a:solidFill>
-                  <a:latin typeface="Aptos Light" panose="020B0004020202020204" pitchFamily="34" charset="0"/>
-                  <a:cs typeface="Kigelia Arabic Light" panose="020F0502020204030204" pitchFamily="34" charset="-78"/>
-                </a:rPr>
-                <a:t>Positions</a:t>
-              </a:r>
-            </a:p>
-          </p:txBody>
-        </p:sp>
-      </p:grpSp>
-      <p:grpSp>
-        <p:nvGrpSpPr>
-          <p:cNvPr id="39" name="Group 38">
-            <a:extLst>
-              <a:ext uri="{FF2B5EF4-FFF2-40B4-BE49-F238E27FC236}">
-                <a16:creationId xmlns:a16="http://schemas.microsoft.com/office/drawing/2014/main" id="{2551677B-861B-FFB5-222C-6054A4E40EB0}"/>
-              </a:ext>
-            </a:extLst>
-          </p:cNvPr>
-          <p:cNvGrpSpPr/>
-          <p:nvPr/>
-        </p:nvGrpSpPr>
-        <p:grpSpPr>
-          <a:xfrm>
-            <a:off x="10872662" y="2258855"/>
-            <a:ext cx="6934325" cy="3747548"/>
-            <a:chOff x="2786000" y="1995151"/>
-            <a:chExt cx="4622883" cy="2498365"/>
-          </a:xfrm>
-        </p:grpSpPr>
-        <p:sp>
-          <p:nvSpPr>
-            <p:cNvPr id="40" name="Rectangle 39">
-              <a:extLst>
-                <a:ext uri="{FF2B5EF4-FFF2-40B4-BE49-F238E27FC236}">
-                  <a16:creationId xmlns:a16="http://schemas.microsoft.com/office/drawing/2014/main" id="{DCB4B1DD-82E4-06CF-7F52-88B95EDD1E90}"/>
-                </a:ext>
-              </a:extLst>
-            </p:cNvPr>
-            <p:cNvSpPr/>
-            <p:nvPr/>
-          </p:nvSpPr>
-          <p:spPr>
-            <a:xfrm>
-              <a:off x="2789217" y="2364483"/>
-              <a:ext cx="4619666" cy="2129033"/>
-            </a:xfrm>
-            <a:prstGeom prst="rect">
-              <a:avLst/>
-            </a:prstGeom>
-            <a:solidFill>
-              <a:schemeClr val="bg1"/>
-            </a:solidFill>
-          </p:spPr>
-          <p:style>
-            <a:lnRef idx="2">
-              <a:schemeClr val="accent1">
-                <a:shade val="15000"/>
-              </a:schemeClr>
-            </a:lnRef>
-            <a:fillRef idx="1">
-              <a:schemeClr val="accent1"/>
-            </a:fillRef>
-            <a:effectRef idx="0">
-              <a:schemeClr val="accent1"/>
-            </a:effectRef>
-            <a:fontRef idx="minor">
-              <a:schemeClr val="lt1"/>
-            </a:fontRef>
-          </p:style>
-          <p:txBody>
-            <a:bodyPr rtlCol="0" anchor="ctr"/>
-            <a:lstStyle/>
-            <a:p>
-              <a:endParaRPr lang="en-US" sz="4050" b="1" dirty="0">
-                <a:solidFill>
-                  <a:schemeClr val="tx1"/>
-                </a:solidFill>
-                <a:latin typeface="Aptos Light" panose="020F0502020204030204" pitchFamily="34" charset="0"/>
-              </a:endParaRPr>
-            </a:p>
-          </p:txBody>
-        </p:sp>
-        <p:sp>
-          <p:nvSpPr>
-            <p:cNvPr id="41" name="TextBox 40">
-              <a:extLst>
-                <a:ext uri="{FF2B5EF4-FFF2-40B4-BE49-F238E27FC236}">
-                  <a16:creationId xmlns:a16="http://schemas.microsoft.com/office/drawing/2014/main" id="{94632B13-B939-B4EB-D126-089B63332ADE}"/>
-                </a:ext>
-              </a:extLst>
-            </p:cNvPr>
-            <p:cNvSpPr txBox="1"/>
-            <p:nvPr/>
-          </p:nvSpPr>
-          <p:spPr>
-            <a:xfrm>
-              <a:off x="2786000" y="1995151"/>
-              <a:ext cx="1790700" cy="348813"/>
-            </a:xfrm>
-            <a:prstGeom prst="rect">
-              <a:avLst/>
-            </a:prstGeom>
-            <a:noFill/>
-          </p:spPr>
-          <p:txBody>
-            <a:bodyPr wrap="square" rtlCol="0">
-              <a:spAutoFit/>
-            </a:bodyPr>
-            <a:lstStyle/>
-            <a:p>
-              <a:r>
-                <a:rPr lang="en-US" sz="2800" u="sng" dirty="0">
-                  <a:solidFill>
-                    <a:schemeClr val="bg1">
-                      <a:lumMod val="95000"/>
-                    </a:schemeClr>
-                  </a:solidFill>
-                  <a:latin typeface="Aptos Light" panose="020B0004020202020204" pitchFamily="34" charset="0"/>
-                  <a:cs typeface="Kigelia Arabic Light" panose="020F0502020204030204" pitchFamily="34" charset="-78"/>
-                </a:rPr>
-                <a:t>Positions</a:t>
-              </a:r>
-            </a:p>
-          </p:txBody>
-        </p:sp>
-      </p:grpSp>
-      <p:sp>
-        <p:nvSpPr>
-          <p:cNvPr id="42" name="Rectangle 41">
-            <a:extLst>
-              <a:ext uri="{FF2B5EF4-FFF2-40B4-BE49-F238E27FC236}">
-                <a16:creationId xmlns:a16="http://schemas.microsoft.com/office/drawing/2014/main" id="{C6C9832C-A291-6EA9-E7F0-B896D17FF25A}"/>
-              </a:ext>
-            </a:extLst>
-          </p:cNvPr>
-          <p:cNvSpPr/>
-          <p:nvPr/>
-        </p:nvSpPr>
-        <p:spPr>
-          <a:xfrm>
-            <a:off x="1392013" y="1475084"/>
-            <a:ext cx="5112326" cy="783771"/>
-          </a:xfrm>
-          <a:prstGeom prst="rect">
-            <a:avLst/>
-          </a:prstGeom>
-          <a:noFill/>
-          <a:ln>
-            <a:noFill/>
-          </a:ln>
-        </p:spPr>
-        <p:style>
-          <a:lnRef idx="2">
-            <a:schemeClr val="accent1">
-              <a:shade val="15000"/>
-            </a:schemeClr>
-          </a:lnRef>
-          <a:fillRef idx="1">
-            <a:schemeClr val="accent1"/>
-          </a:fillRef>
-          <a:effectRef idx="0">
-            <a:schemeClr val="accent1"/>
-          </a:effectRef>
-          <a:fontRef idx="minor">
-            <a:schemeClr val="lt1"/>
-          </a:fontRef>
-        </p:style>
-        <p:txBody>
-          <a:bodyPr rtlCol="0" anchor="ctr"/>
-          <a:lstStyle/>
-          <a:p>
-            <a:pPr algn="ctr"/>
-            <a:r>
-              <a:rPr lang="en-US" sz="4050" b="1" spc="900" dirty="0">
-                <a:gradFill flip="none" rotWithShape="1">
-                  <a:gsLst>
-                    <a:gs pos="0">
-                      <a:schemeClr val="tx1">
-                        <a:tint val="66000"/>
-                        <a:satMod val="160000"/>
-                      </a:schemeClr>
-                    </a:gs>
-                    <a:gs pos="50000">
-                      <a:schemeClr val="tx1">
-                        <a:tint val="44500"/>
-                        <a:satMod val="160000"/>
-                      </a:schemeClr>
-                    </a:gs>
-                    <a:gs pos="100000">
-                      <a:schemeClr val="tx1">
-                        <a:tint val="23500"/>
-                        <a:satMod val="160000"/>
-                      </a:schemeClr>
-                    </a:gs>
-                  </a:gsLst>
-                  <a:lin ang="2700000" scaled="1"/>
-                  <a:tileRect/>
-                </a:gradFill>
-                <a:latin typeface="Aptos Light" panose="020F0502020204030204" pitchFamily="34" charset="0"/>
               </a:rPr>
-              <a:t>HEXAPOD</a:t>
-            </a:r>
-          </a:p>
-        </p:txBody>
-      </p:sp>
-      <p:sp>
-        <p:nvSpPr>
-          <p:cNvPr id="44" name="Rectangle 43">
-            <a:extLst>
-              <a:ext uri="{FF2B5EF4-FFF2-40B4-BE49-F238E27FC236}">
-                <a16:creationId xmlns:a16="http://schemas.microsoft.com/office/drawing/2014/main" id="{3F0D2B1E-9E77-3A64-E535-CC0CCAF25A33}"/>
-              </a:ext>
-            </a:extLst>
-          </p:cNvPr>
-          <p:cNvSpPr/>
-          <p:nvPr/>
-        </p:nvSpPr>
-        <p:spPr>
-          <a:xfrm>
-            <a:off x="11793067" y="1475084"/>
-            <a:ext cx="5112326" cy="783771"/>
-          </a:xfrm>
-          <a:prstGeom prst="rect">
-            <a:avLst/>
-          </a:prstGeom>
-          <a:noFill/>
-          <a:ln>
-            <a:noFill/>
-          </a:ln>
-        </p:spPr>
-        <p:style>
-          <a:lnRef idx="2">
-            <a:schemeClr val="accent1">
-              <a:shade val="15000"/>
-            </a:schemeClr>
-          </a:lnRef>
-          <a:fillRef idx="1">
-            <a:schemeClr val="accent1"/>
-          </a:fillRef>
-          <a:effectRef idx="0">
-            <a:schemeClr val="accent1"/>
-          </a:effectRef>
-          <a:fontRef idx="minor">
-            <a:schemeClr val="lt1"/>
-          </a:fontRef>
-        </p:style>
-        <p:txBody>
-          <a:bodyPr rtlCol="0" anchor="ctr"/>
-          <a:lstStyle/>
-          <a:p>
-            <a:pPr algn="ctr"/>
-            <a:r>
-              <a:rPr lang="en-US" sz="4050" b="1" spc="900" dirty="0">
-                <a:gradFill flip="none" rotWithShape="1">
-                  <a:gsLst>
-                    <a:gs pos="0">
-                      <a:schemeClr val="tx1">
-                        <a:tint val="66000"/>
-                        <a:satMod val="160000"/>
-                      </a:schemeClr>
-                    </a:gs>
-                    <a:gs pos="50000">
-                      <a:schemeClr val="tx1">
-                        <a:tint val="44500"/>
-                        <a:satMod val="160000"/>
-                      </a:schemeClr>
-                    </a:gs>
-                    <a:gs pos="100000">
-                      <a:schemeClr val="tx1">
-                        <a:tint val="23500"/>
-                        <a:satMod val="160000"/>
-                      </a:schemeClr>
-                    </a:gs>
-                  </a:gsLst>
-                  <a:path path="circle">
-                    <a:fillToRect t="100000" r="100000"/>
-                  </a:path>
-                  <a:tileRect l="-100000" b="-100000"/>
-                </a:gradFill>
-                <a:latin typeface="Aptos Light" panose="020F0502020204030204" pitchFamily="34" charset="0"/>
-              </a:rPr>
-              <a:t>OPTI-TRACK</a:t>
+              <a:t>Random</a:t>
             </a:r>
           </a:p>
         </p:txBody>
@@ -3905,7 +3285,7 @@
         </p:nvSpPr>
         <p:spPr>
           <a:xfrm>
-            <a:off x="8603395" y="320871"/>
+            <a:off x="8574519" y="277204"/>
             <a:ext cx="2409950" cy="783771"/>
           </a:xfrm>
           <a:prstGeom prst="roundRect">
@@ -3938,109 +3318,18 @@
           <a:lstStyle/>
           <a:p>
             <a:pPr algn="ctr"/>
-            <a:endParaRPr lang="en-US" sz="1350" b="1" spc="900" dirty="0">
-              <a:solidFill>
-                <a:schemeClr val="tx1"/>
-              </a:solidFill>
-              <a:latin typeface="Aptos Light" panose="020F0502020204030204" pitchFamily="34" charset="0"/>
-            </a:endParaRPr>
-          </a:p>
-        </p:txBody>
-      </p:sp>
-      <p:sp>
-        <p:nvSpPr>
-          <p:cNvPr id="50" name="Rectangle: Rounded Corners 49">
-            <a:extLst>
-              <a:ext uri="{FF2B5EF4-FFF2-40B4-BE49-F238E27FC236}">
-                <a16:creationId xmlns:a16="http://schemas.microsoft.com/office/drawing/2014/main" id="{2E865633-21A5-E3E4-8AB5-796837E26226}"/>
-              </a:ext>
-            </a:extLst>
-          </p:cNvPr>
-          <p:cNvSpPr/>
-          <p:nvPr/>
-        </p:nvSpPr>
-        <p:spPr>
-          <a:xfrm>
-            <a:off x="11415713" y="335643"/>
-            <a:ext cx="2409950" cy="783771"/>
-          </a:xfrm>
-          <a:prstGeom prst="roundRect">
-            <a:avLst/>
-          </a:prstGeom>
-          <a:solidFill>
-            <a:schemeClr val="bg1">
-              <a:lumMod val="85000"/>
-            </a:schemeClr>
-          </a:solidFill>
-        </p:spPr>
-        <p:style>
-          <a:lnRef idx="2">
-            <a:schemeClr val="accent1">
-              <a:shade val="15000"/>
-            </a:schemeClr>
-          </a:lnRef>
-          <a:fillRef idx="1">
-            <a:schemeClr val="accent1"/>
-          </a:fillRef>
-          <a:effectRef idx="0">
-            <a:schemeClr val="accent1"/>
-          </a:effectRef>
-          <a:fontRef idx="minor">
-            <a:schemeClr val="lt1"/>
-          </a:fontRef>
-        </p:style>
-        <p:txBody>
-          <a:bodyPr rtlCol="0" anchor="ctr"/>
-          <a:lstStyle/>
-          <a:p>
-            <a:pPr algn="ctr"/>
-            <a:endParaRPr lang="en-US" sz="1350" b="1" spc="900" dirty="0">
-              <a:solidFill>
-                <a:schemeClr val="tx1"/>
-              </a:solidFill>
-              <a:latin typeface="Aptos Light" panose="020F0502020204030204" pitchFamily="34" charset="0"/>
-            </a:endParaRPr>
-          </a:p>
-        </p:txBody>
-      </p:sp>
-      <p:cxnSp>
-        <p:nvCxnSpPr>
-          <p:cNvPr id="52" name="Straight Connector 51">
-            <a:extLst>
-              <a:ext uri="{FF2B5EF4-FFF2-40B4-BE49-F238E27FC236}">
-                <a16:creationId xmlns:a16="http://schemas.microsoft.com/office/drawing/2014/main" id="{32E9A60A-34EC-4BC4-EA14-B1B1E2C768C2}"/>
-              </a:ext>
-            </a:extLst>
-          </p:cNvPr>
-          <p:cNvCxnSpPr>
-            <a:cxnSpLocks/>
-          </p:cNvCxnSpPr>
-          <p:nvPr/>
-        </p:nvCxnSpPr>
-        <p:spPr>
-          <a:xfrm>
-            <a:off x="9144000" y="1748519"/>
-            <a:ext cx="0" cy="8153400"/>
-          </a:xfrm>
-          <a:prstGeom prst="line">
-            <a:avLst/>
-          </a:prstGeom>
-        </p:spPr>
-        <p:style>
-          <a:lnRef idx="2">
-            <a:schemeClr val="dk1"/>
-          </a:lnRef>
-          <a:fillRef idx="0">
-            <a:schemeClr val="dk1"/>
-          </a:fillRef>
-          <a:effectRef idx="1">
-            <a:schemeClr val="dk1"/>
-          </a:effectRef>
-          <a:fontRef idx="minor">
-            <a:schemeClr val="tx1"/>
-          </a:fontRef>
-        </p:style>
-      </p:cxnSp>
+            <a:r>
+              <a:rPr lang="en-US" sz="1350" b="1" dirty="0">
+                <a:solidFill>
+                  <a:schemeClr val="tx1"/>
+                </a:solidFill>
+                <a:latin typeface="Aptos Light" panose="020F0502020204030204" pitchFamily="34" charset="0"/>
+              </a:rPr>
+              <a:t>User-Defined</a:t>
+            </a:r>
+          </a:p>
+        </p:txBody>
+      </p:sp>
       <p:pic>
         <p:nvPicPr>
           <p:cNvPr id="56" name="Picture 55" descr="A blue and gold logo&#10;&#10;Description automatically generated">
@@ -4077,6 +3366,914 @@
           </a:prstGeom>
         </p:spPr>
       </p:pic>
+      <p:grpSp>
+        <p:nvGrpSpPr>
+          <p:cNvPr id="16" name="Group 15">
+            <a:extLst>
+              <a:ext uri="{FF2B5EF4-FFF2-40B4-BE49-F238E27FC236}">
+                <a16:creationId xmlns:a16="http://schemas.microsoft.com/office/drawing/2014/main" id="{E1DDED18-DD65-A85F-B867-4D7C59E7C691}"/>
+              </a:ext>
+            </a:extLst>
+          </p:cNvPr>
+          <p:cNvGrpSpPr/>
+          <p:nvPr/>
+        </p:nvGrpSpPr>
+        <p:grpSpPr>
+          <a:xfrm>
+            <a:off x="276103" y="1436134"/>
+            <a:ext cx="6929498" cy="8512655"/>
+            <a:chOff x="483427" y="1475084"/>
+            <a:chExt cx="6929498" cy="8512655"/>
+          </a:xfrm>
+        </p:grpSpPr>
+        <p:sp>
+          <p:nvSpPr>
+            <p:cNvPr id="37" name="Rectangle 36">
+              <a:extLst>
+                <a:ext uri="{FF2B5EF4-FFF2-40B4-BE49-F238E27FC236}">
+                  <a16:creationId xmlns:a16="http://schemas.microsoft.com/office/drawing/2014/main" id="{9E512C58-0106-DA1F-2201-2B29B6B94074}"/>
+                </a:ext>
+              </a:extLst>
+            </p:cNvPr>
+            <p:cNvSpPr/>
+            <p:nvPr/>
+          </p:nvSpPr>
+          <p:spPr>
+            <a:xfrm>
+              <a:off x="483427" y="2258855"/>
+              <a:ext cx="6929498" cy="2351646"/>
+            </a:xfrm>
+            <a:prstGeom prst="rect">
+              <a:avLst/>
+            </a:prstGeom>
+            <a:solidFill>
+              <a:schemeClr val="bg1"/>
+            </a:solidFill>
+          </p:spPr>
+          <p:style>
+            <a:lnRef idx="2">
+              <a:schemeClr val="accent1">
+                <a:shade val="15000"/>
+              </a:schemeClr>
+            </a:lnRef>
+            <a:fillRef idx="1">
+              <a:schemeClr val="accent1"/>
+            </a:fillRef>
+            <a:effectRef idx="0">
+              <a:schemeClr val="accent1"/>
+            </a:effectRef>
+            <a:fontRef idx="minor">
+              <a:schemeClr val="lt1"/>
+            </a:fontRef>
+          </p:style>
+          <p:txBody>
+            <a:bodyPr rtlCol="0" anchor="ctr"/>
+            <a:lstStyle/>
+            <a:p>
+              <a:endParaRPr lang="en-US" sz="4050" b="1" dirty="0">
+                <a:solidFill>
+                  <a:schemeClr val="tx1"/>
+                </a:solidFill>
+                <a:latin typeface="Aptos Light" panose="020F0502020204030204" pitchFamily="34" charset="0"/>
+              </a:endParaRPr>
+            </a:p>
+          </p:txBody>
+        </p:sp>
+        <p:sp>
+          <p:nvSpPr>
+            <p:cNvPr id="42" name="Rectangle 41">
+              <a:extLst>
+                <a:ext uri="{FF2B5EF4-FFF2-40B4-BE49-F238E27FC236}">
+                  <a16:creationId xmlns:a16="http://schemas.microsoft.com/office/drawing/2014/main" id="{C6C9832C-A291-6EA9-E7F0-B896D17FF25A}"/>
+                </a:ext>
+              </a:extLst>
+            </p:cNvPr>
+            <p:cNvSpPr/>
+            <p:nvPr/>
+          </p:nvSpPr>
+          <p:spPr>
+            <a:xfrm>
+              <a:off x="1392013" y="1475084"/>
+              <a:ext cx="5112326" cy="783771"/>
+            </a:xfrm>
+            <a:prstGeom prst="rect">
+              <a:avLst/>
+            </a:prstGeom>
+            <a:noFill/>
+            <a:ln>
+              <a:noFill/>
+            </a:ln>
+          </p:spPr>
+          <p:style>
+            <a:lnRef idx="2">
+              <a:schemeClr val="accent1">
+                <a:shade val="15000"/>
+              </a:schemeClr>
+            </a:lnRef>
+            <a:fillRef idx="1">
+              <a:schemeClr val="accent1"/>
+            </a:fillRef>
+            <a:effectRef idx="0">
+              <a:schemeClr val="accent1"/>
+            </a:effectRef>
+            <a:fontRef idx="minor">
+              <a:schemeClr val="lt1"/>
+            </a:fontRef>
+          </p:style>
+          <p:txBody>
+            <a:bodyPr rtlCol="0" anchor="ctr"/>
+            <a:lstStyle/>
+            <a:p>
+              <a:pPr algn="ctr"/>
+              <a:r>
+                <a:rPr lang="en-US" sz="4050" b="1" spc="900" dirty="0">
+                  <a:gradFill flip="none" rotWithShape="1">
+                    <a:gsLst>
+                      <a:gs pos="0">
+                        <a:schemeClr val="tx1">
+                          <a:tint val="66000"/>
+                          <a:satMod val="160000"/>
+                        </a:schemeClr>
+                      </a:gs>
+                      <a:gs pos="50000">
+                        <a:schemeClr val="tx1">
+                          <a:tint val="44500"/>
+                          <a:satMod val="160000"/>
+                        </a:schemeClr>
+                      </a:gs>
+                      <a:gs pos="100000">
+                        <a:schemeClr val="tx1">
+                          <a:tint val="23500"/>
+                          <a:satMod val="160000"/>
+                        </a:schemeClr>
+                      </a:gs>
+                    </a:gsLst>
+                    <a:lin ang="2700000" scaled="1"/>
+                    <a:tileRect/>
+                  </a:gradFill>
+                  <a:latin typeface="Aptos Light" panose="020F0502020204030204" pitchFamily="34" charset="0"/>
+                </a:rPr>
+                <a:t>ATTITUDE</a:t>
+              </a:r>
+            </a:p>
+          </p:txBody>
+        </p:sp>
+        <p:sp>
+          <p:nvSpPr>
+            <p:cNvPr id="7" name="Rectangle 6">
+              <a:extLst>
+                <a:ext uri="{FF2B5EF4-FFF2-40B4-BE49-F238E27FC236}">
+                  <a16:creationId xmlns:a16="http://schemas.microsoft.com/office/drawing/2014/main" id="{5BC451AD-8883-D57E-6379-24068EBB169E}"/>
+                </a:ext>
+              </a:extLst>
+            </p:cNvPr>
+            <p:cNvSpPr/>
+            <p:nvPr/>
+          </p:nvSpPr>
+          <p:spPr>
+            <a:xfrm>
+              <a:off x="483427" y="4917958"/>
+              <a:ext cx="6929498" cy="2351646"/>
+            </a:xfrm>
+            <a:prstGeom prst="rect">
+              <a:avLst/>
+            </a:prstGeom>
+            <a:solidFill>
+              <a:schemeClr val="bg1"/>
+            </a:solidFill>
+          </p:spPr>
+          <p:style>
+            <a:lnRef idx="2">
+              <a:schemeClr val="accent1">
+                <a:shade val="15000"/>
+              </a:schemeClr>
+            </a:lnRef>
+            <a:fillRef idx="1">
+              <a:schemeClr val="accent1"/>
+            </a:fillRef>
+            <a:effectRef idx="0">
+              <a:schemeClr val="accent1"/>
+            </a:effectRef>
+            <a:fontRef idx="minor">
+              <a:schemeClr val="lt1"/>
+            </a:fontRef>
+          </p:style>
+          <p:txBody>
+            <a:bodyPr rtlCol="0" anchor="ctr"/>
+            <a:lstStyle/>
+            <a:p>
+              <a:endParaRPr lang="en-US" sz="4050" b="1" dirty="0">
+                <a:solidFill>
+                  <a:schemeClr val="tx1"/>
+                </a:solidFill>
+                <a:latin typeface="Aptos Light" panose="020F0502020204030204" pitchFamily="34" charset="0"/>
+              </a:endParaRPr>
+            </a:p>
+          </p:txBody>
+        </p:sp>
+        <p:sp>
+          <p:nvSpPr>
+            <p:cNvPr id="8" name="Rectangle 7">
+              <a:extLst>
+                <a:ext uri="{FF2B5EF4-FFF2-40B4-BE49-F238E27FC236}">
+                  <a16:creationId xmlns:a16="http://schemas.microsoft.com/office/drawing/2014/main" id="{6C7F567F-8042-CD8B-128A-482334586A86}"/>
+                </a:ext>
+              </a:extLst>
+            </p:cNvPr>
+            <p:cNvSpPr/>
+            <p:nvPr/>
+          </p:nvSpPr>
+          <p:spPr>
+            <a:xfrm>
+              <a:off x="483427" y="7636093"/>
+              <a:ext cx="6929498" cy="2351646"/>
+            </a:xfrm>
+            <a:prstGeom prst="rect">
+              <a:avLst/>
+            </a:prstGeom>
+            <a:solidFill>
+              <a:schemeClr val="bg1"/>
+            </a:solidFill>
+          </p:spPr>
+          <p:style>
+            <a:lnRef idx="2">
+              <a:schemeClr val="accent1">
+                <a:shade val="15000"/>
+              </a:schemeClr>
+            </a:lnRef>
+            <a:fillRef idx="1">
+              <a:schemeClr val="accent1"/>
+            </a:fillRef>
+            <a:effectRef idx="0">
+              <a:schemeClr val="accent1"/>
+            </a:effectRef>
+            <a:fontRef idx="minor">
+              <a:schemeClr val="lt1"/>
+            </a:fontRef>
+          </p:style>
+          <p:txBody>
+            <a:bodyPr rtlCol="0" anchor="ctr"/>
+            <a:lstStyle/>
+            <a:p>
+              <a:endParaRPr lang="en-US" sz="4050" b="1" dirty="0">
+                <a:solidFill>
+                  <a:schemeClr val="tx1"/>
+                </a:solidFill>
+                <a:latin typeface="Aptos Light" panose="020F0502020204030204" pitchFamily="34" charset="0"/>
+              </a:endParaRPr>
+            </a:p>
+          </p:txBody>
+        </p:sp>
+      </p:grpSp>
+      <p:grpSp>
+        <p:nvGrpSpPr>
+          <p:cNvPr id="17" name="Group 16">
+            <a:extLst>
+              <a:ext uri="{FF2B5EF4-FFF2-40B4-BE49-F238E27FC236}">
+                <a16:creationId xmlns:a16="http://schemas.microsoft.com/office/drawing/2014/main" id="{91C633C7-2B83-1E31-91FF-C8C9B968FA46}"/>
+              </a:ext>
+            </a:extLst>
+          </p:cNvPr>
+          <p:cNvGrpSpPr/>
+          <p:nvPr/>
+        </p:nvGrpSpPr>
+        <p:grpSpPr>
+          <a:xfrm>
+            <a:off x="7519720" y="1436134"/>
+            <a:ext cx="6929498" cy="8498317"/>
+            <a:chOff x="10875077" y="1475084"/>
+            <a:chExt cx="6929498" cy="8498317"/>
+          </a:xfrm>
+        </p:grpSpPr>
+        <p:sp>
+          <p:nvSpPr>
+            <p:cNvPr id="44" name="Rectangle 43">
+              <a:extLst>
+                <a:ext uri="{FF2B5EF4-FFF2-40B4-BE49-F238E27FC236}">
+                  <a16:creationId xmlns:a16="http://schemas.microsoft.com/office/drawing/2014/main" id="{3F0D2B1E-9E77-3A64-E535-CC0CCAF25A33}"/>
+                </a:ext>
+              </a:extLst>
+            </p:cNvPr>
+            <p:cNvSpPr/>
+            <p:nvPr/>
+          </p:nvSpPr>
+          <p:spPr>
+            <a:xfrm>
+              <a:off x="11793067" y="1475084"/>
+              <a:ext cx="5112326" cy="783771"/>
+            </a:xfrm>
+            <a:prstGeom prst="rect">
+              <a:avLst/>
+            </a:prstGeom>
+            <a:noFill/>
+            <a:ln>
+              <a:noFill/>
+            </a:ln>
+          </p:spPr>
+          <p:style>
+            <a:lnRef idx="2">
+              <a:schemeClr val="accent1">
+                <a:shade val="15000"/>
+              </a:schemeClr>
+            </a:lnRef>
+            <a:fillRef idx="1">
+              <a:schemeClr val="accent1"/>
+            </a:fillRef>
+            <a:effectRef idx="0">
+              <a:schemeClr val="accent1"/>
+            </a:effectRef>
+            <a:fontRef idx="minor">
+              <a:schemeClr val="lt1"/>
+            </a:fontRef>
+          </p:style>
+          <p:txBody>
+            <a:bodyPr rtlCol="0" anchor="ctr"/>
+            <a:lstStyle/>
+            <a:p>
+              <a:pPr algn="ctr"/>
+              <a:r>
+                <a:rPr lang="en-US" sz="4050" b="1" spc="900" dirty="0">
+                  <a:gradFill flip="none" rotWithShape="1">
+                    <a:gsLst>
+                      <a:gs pos="0">
+                        <a:schemeClr val="tx1">
+                          <a:tint val="66000"/>
+                          <a:satMod val="160000"/>
+                        </a:schemeClr>
+                      </a:gs>
+                      <a:gs pos="50000">
+                        <a:schemeClr val="tx1">
+                          <a:tint val="44500"/>
+                          <a:satMod val="160000"/>
+                        </a:schemeClr>
+                      </a:gs>
+                      <a:gs pos="100000">
+                        <a:schemeClr val="tx1">
+                          <a:tint val="23500"/>
+                          <a:satMod val="160000"/>
+                        </a:schemeClr>
+                      </a:gs>
+                    </a:gsLst>
+                    <a:path path="circle">
+                      <a:fillToRect t="100000" r="100000"/>
+                    </a:path>
+                    <a:tileRect l="-100000" b="-100000"/>
+                  </a:gradFill>
+                  <a:latin typeface="Aptos Light" panose="020F0502020204030204" pitchFamily="34" charset="0"/>
+                </a:rPr>
+                <a:t>ERROR</a:t>
+              </a:r>
+            </a:p>
+          </p:txBody>
+        </p:sp>
+        <p:sp>
+          <p:nvSpPr>
+            <p:cNvPr id="13" name="Rectangle 12">
+              <a:extLst>
+                <a:ext uri="{FF2B5EF4-FFF2-40B4-BE49-F238E27FC236}">
+                  <a16:creationId xmlns:a16="http://schemas.microsoft.com/office/drawing/2014/main" id="{65CDC5F7-8650-C7F3-275E-65C46141B229}"/>
+                </a:ext>
+              </a:extLst>
+            </p:cNvPr>
+            <p:cNvSpPr/>
+            <p:nvPr/>
+          </p:nvSpPr>
+          <p:spPr>
+            <a:xfrm>
+              <a:off x="10875077" y="2244517"/>
+              <a:ext cx="6929498" cy="2351646"/>
+            </a:xfrm>
+            <a:prstGeom prst="rect">
+              <a:avLst/>
+            </a:prstGeom>
+            <a:solidFill>
+              <a:schemeClr val="bg1"/>
+            </a:solidFill>
+          </p:spPr>
+          <p:style>
+            <a:lnRef idx="2">
+              <a:schemeClr val="accent1">
+                <a:shade val="15000"/>
+              </a:schemeClr>
+            </a:lnRef>
+            <a:fillRef idx="1">
+              <a:schemeClr val="accent1"/>
+            </a:fillRef>
+            <a:effectRef idx="0">
+              <a:schemeClr val="accent1"/>
+            </a:effectRef>
+            <a:fontRef idx="minor">
+              <a:schemeClr val="lt1"/>
+            </a:fontRef>
+          </p:style>
+          <p:txBody>
+            <a:bodyPr rtlCol="0" anchor="ctr"/>
+            <a:lstStyle/>
+            <a:p>
+              <a:endParaRPr lang="en-US" sz="4050" b="1" dirty="0">
+                <a:solidFill>
+                  <a:schemeClr val="tx1"/>
+                </a:solidFill>
+                <a:latin typeface="Aptos Light" panose="020F0502020204030204" pitchFamily="34" charset="0"/>
+              </a:endParaRPr>
+            </a:p>
+          </p:txBody>
+        </p:sp>
+        <p:sp>
+          <p:nvSpPr>
+            <p:cNvPr id="14" name="Rectangle 13">
+              <a:extLst>
+                <a:ext uri="{FF2B5EF4-FFF2-40B4-BE49-F238E27FC236}">
+                  <a16:creationId xmlns:a16="http://schemas.microsoft.com/office/drawing/2014/main" id="{9B3E1097-9098-8543-ADE7-CFB20A0A5502}"/>
+                </a:ext>
+              </a:extLst>
+            </p:cNvPr>
+            <p:cNvSpPr/>
+            <p:nvPr/>
+          </p:nvSpPr>
+          <p:spPr>
+            <a:xfrm>
+              <a:off x="10875077" y="4903620"/>
+              <a:ext cx="6929498" cy="2351646"/>
+            </a:xfrm>
+            <a:prstGeom prst="rect">
+              <a:avLst/>
+            </a:prstGeom>
+            <a:solidFill>
+              <a:schemeClr val="bg1"/>
+            </a:solidFill>
+          </p:spPr>
+          <p:style>
+            <a:lnRef idx="2">
+              <a:schemeClr val="accent1">
+                <a:shade val="15000"/>
+              </a:schemeClr>
+            </a:lnRef>
+            <a:fillRef idx="1">
+              <a:schemeClr val="accent1"/>
+            </a:fillRef>
+            <a:effectRef idx="0">
+              <a:schemeClr val="accent1"/>
+            </a:effectRef>
+            <a:fontRef idx="minor">
+              <a:schemeClr val="lt1"/>
+            </a:fontRef>
+          </p:style>
+          <p:txBody>
+            <a:bodyPr rtlCol="0" anchor="ctr"/>
+            <a:lstStyle/>
+            <a:p>
+              <a:endParaRPr lang="en-US" sz="4050" b="1" dirty="0">
+                <a:solidFill>
+                  <a:schemeClr val="tx1"/>
+                </a:solidFill>
+                <a:latin typeface="Aptos Light" panose="020F0502020204030204" pitchFamily="34" charset="0"/>
+              </a:endParaRPr>
+            </a:p>
+          </p:txBody>
+        </p:sp>
+        <p:sp>
+          <p:nvSpPr>
+            <p:cNvPr id="15" name="Rectangle 14">
+              <a:extLst>
+                <a:ext uri="{FF2B5EF4-FFF2-40B4-BE49-F238E27FC236}">
+                  <a16:creationId xmlns:a16="http://schemas.microsoft.com/office/drawing/2014/main" id="{F1910B90-99D9-14EA-249C-E3960210EDB5}"/>
+                </a:ext>
+              </a:extLst>
+            </p:cNvPr>
+            <p:cNvSpPr/>
+            <p:nvPr/>
+          </p:nvSpPr>
+          <p:spPr>
+            <a:xfrm>
+              <a:off x="10875077" y="7621755"/>
+              <a:ext cx="6929498" cy="2351646"/>
+            </a:xfrm>
+            <a:prstGeom prst="rect">
+              <a:avLst/>
+            </a:prstGeom>
+            <a:solidFill>
+              <a:schemeClr val="bg1"/>
+            </a:solidFill>
+          </p:spPr>
+          <p:style>
+            <a:lnRef idx="2">
+              <a:schemeClr val="accent1">
+                <a:shade val="15000"/>
+              </a:schemeClr>
+            </a:lnRef>
+            <a:fillRef idx="1">
+              <a:schemeClr val="accent1"/>
+            </a:fillRef>
+            <a:effectRef idx="0">
+              <a:schemeClr val="accent1"/>
+            </a:effectRef>
+            <a:fontRef idx="minor">
+              <a:schemeClr val="lt1"/>
+            </a:fontRef>
+          </p:style>
+          <p:txBody>
+            <a:bodyPr rtlCol="0" anchor="ctr"/>
+            <a:lstStyle/>
+            <a:p>
+              <a:endParaRPr lang="en-US" sz="4050" b="1" dirty="0">
+                <a:solidFill>
+                  <a:schemeClr val="tx1"/>
+                </a:solidFill>
+                <a:latin typeface="Aptos Light" panose="020F0502020204030204" pitchFamily="34" charset="0"/>
+              </a:endParaRPr>
+            </a:p>
+          </p:txBody>
+        </p:sp>
+      </p:grpSp>
+      <p:sp>
+        <p:nvSpPr>
+          <p:cNvPr id="18" name="Rectangle 17">
+            <a:extLst>
+              <a:ext uri="{FF2B5EF4-FFF2-40B4-BE49-F238E27FC236}">
+                <a16:creationId xmlns:a16="http://schemas.microsoft.com/office/drawing/2014/main" id="{008FDC78-9BE6-8DAD-1DF9-D061E00B880A}"/>
+              </a:ext>
+            </a:extLst>
+          </p:cNvPr>
+          <p:cNvSpPr/>
+          <p:nvPr/>
+        </p:nvSpPr>
+        <p:spPr>
+          <a:xfrm>
+            <a:off x="14763337" y="8582795"/>
+            <a:ext cx="3248560" cy="1351656"/>
+          </a:xfrm>
+          <a:prstGeom prst="rect">
+            <a:avLst/>
+          </a:prstGeom>
+          <a:solidFill>
+            <a:schemeClr val="bg1"/>
+          </a:solidFill>
+        </p:spPr>
+        <p:style>
+          <a:lnRef idx="2">
+            <a:schemeClr val="accent1">
+              <a:shade val="15000"/>
+            </a:schemeClr>
+          </a:lnRef>
+          <a:fillRef idx="1">
+            <a:schemeClr val="accent1"/>
+          </a:fillRef>
+          <a:effectRef idx="0">
+            <a:schemeClr val="accent1"/>
+          </a:effectRef>
+          <a:fontRef idx="minor">
+            <a:schemeClr val="lt1"/>
+          </a:fontRef>
+        </p:style>
+        <p:txBody>
+          <a:bodyPr rtlCol="0" anchor="ctr"/>
+          <a:lstStyle/>
+          <a:p>
+            <a:pPr algn="ctr"/>
+            <a:r>
+              <a:rPr lang="en-US" sz="2000" b="1" dirty="0">
+                <a:solidFill>
+                  <a:schemeClr val="tx1"/>
+                </a:solidFill>
+                <a:latin typeface="Aptos Light" panose="020F0502020204030204" pitchFamily="34" charset="0"/>
+              </a:rPr>
+              <a:t>TOTAL AVERAGE ERROR</a:t>
+            </a:r>
+          </a:p>
+          <a:p>
+            <a:pPr algn="ctr"/>
+            <a:endParaRPr lang="en-US" sz="2000" b="1" dirty="0">
+              <a:solidFill>
+                <a:schemeClr val="tx1"/>
+              </a:solidFill>
+              <a:latin typeface="Aptos Light" panose="020F0502020204030204" pitchFamily="34" charset="0"/>
+            </a:endParaRPr>
+          </a:p>
+          <a:p>
+            <a:pPr algn="ctr"/>
+            <a:endParaRPr lang="en-US" sz="2000" b="1" dirty="0">
+              <a:solidFill>
+                <a:schemeClr val="tx1"/>
+              </a:solidFill>
+              <a:latin typeface="Aptos Light" panose="020F0502020204030204" pitchFamily="34" charset="0"/>
+            </a:endParaRPr>
+          </a:p>
+        </p:txBody>
+      </p:sp>
+      <p:sp>
+        <p:nvSpPr>
+          <p:cNvPr id="19" name="Rectangle: Rounded Corners 18">
+            <a:extLst>
+              <a:ext uri="{FF2B5EF4-FFF2-40B4-BE49-F238E27FC236}">
+                <a16:creationId xmlns:a16="http://schemas.microsoft.com/office/drawing/2014/main" id="{3E2C8262-E00C-3994-85CD-2147242DFC79}"/>
+              </a:ext>
+            </a:extLst>
+          </p:cNvPr>
+          <p:cNvSpPr/>
+          <p:nvPr/>
+        </p:nvSpPr>
+        <p:spPr>
+          <a:xfrm>
+            <a:off x="15115485" y="2128380"/>
+            <a:ext cx="2544264" cy="5087936"/>
+          </a:xfrm>
+          <a:prstGeom prst="roundRect">
+            <a:avLst/>
+          </a:prstGeom>
+          <a:solidFill>
+            <a:schemeClr val="bg1">
+              <a:lumMod val="85000"/>
+            </a:schemeClr>
+          </a:solidFill>
+        </p:spPr>
+        <p:style>
+          <a:lnRef idx="2">
+            <a:schemeClr val="accent1">
+              <a:shade val="15000"/>
+            </a:schemeClr>
+          </a:lnRef>
+          <a:fillRef idx="1">
+            <a:schemeClr val="accent1"/>
+          </a:fillRef>
+          <a:effectRef idx="0">
+            <a:schemeClr val="accent1"/>
+          </a:effectRef>
+          <a:fontRef idx="minor">
+            <a:schemeClr val="lt1"/>
+          </a:fontRef>
+        </p:style>
+        <p:txBody>
+          <a:bodyPr rtlCol="0" anchor="ctr"/>
+          <a:lstStyle/>
+          <a:p>
+            <a:pPr algn="ctr"/>
+            <a:r>
+              <a:rPr lang="en-US" sz="1350" b="1" dirty="0">
+                <a:solidFill>
+                  <a:schemeClr val="tx1"/>
+                </a:solidFill>
+                <a:latin typeface="Aptos Light" panose="020F0502020204030204" pitchFamily="34" charset="0"/>
+              </a:rPr>
+              <a:t>INPUT PERTURBATION</a:t>
+            </a:r>
+          </a:p>
+          <a:p>
+            <a:pPr algn="ctr"/>
+            <a:endParaRPr lang="en-US" sz="1350" b="1" dirty="0">
+              <a:solidFill>
+                <a:schemeClr val="tx1"/>
+              </a:solidFill>
+              <a:latin typeface="Aptos Light" panose="020F0502020204030204" pitchFamily="34" charset="0"/>
+            </a:endParaRPr>
+          </a:p>
+          <a:p>
+            <a:pPr algn="ctr"/>
+            <a:endParaRPr lang="en-US" sz="1350" b="1" dirty="0">
+              <a:solidFill>
+                <a:schemeClr val="tx1"/>
+              </a:solidFill>
+              <a:latin typeface="Aptos Light" panose="020F0502020204030204" pitchFamily="34" charset="0"/>
+            </a:endParaRPr>
+          </a:p>
+          <a:p>
+            <a:pPr algn="ctr"/>
+            <a:endParaRPr lang="en-US" sz="1350" b="1" dirty="0">
+              <a:solidFill>
+                <a:schemeClr val="tx1"/>
+              </a:solidFill>
+              <a:latin typeface="Aptos Light" panose="020F0502020204030204" pitchFamily="34" charset="0"/>
+            </a:endParaRPr>
+          </a:p>
+          <a:p>
+            <a:pPr algn="ctr"/>
+            <a:endParaRPr lang="en-US" sz="1350" b="1" dirty="0">
+              <a:solidFill>
+                <a:schemeClr val="tx1"/>
+              </a:solidFill>
+              <a:latin typeface="Aptos Light" panose="020F0502020204030204" pitchFamily="34" charset="0"/>
+            </a:endParaRPr>
+          </a:p>
+          <a:p>
+            <a:pPr algn="ctr"/>
+            <a:endParaRPr lang="en-US" sz="1350" b="1" dirty="0">
+              <a:solidFill>
+                <a:schemeClr val="tx1"/>
+              </a:solidFill>
+              <a:latin typeface="Aptos Light" panose="020F0502020204030204" pitchFamily="34" charset="0"/>
+            </a:endParaRPr>
+          </a:p>
+          <a:p>
+            <a:pPr algn="ctr"/>
+            <a:endParaRPr lang="en-US" sz="1350" b="1" dirty="0">
+              <a:solidFill>
+                <a:schemeClr val="tx1"/>
+              </a:solidFill>
+              <a:latin typeface="Aptos Light" panose="020F0502020204030204" pitchFamily="34" charset="0"/>
+            </a:endParaRPr>
+          </a:p>
+          <a:p>
+            <a:pPr algn="ctr"/>
+            <a:endParaRPr lang="en-US" sz="1350" b="1" dirty="0">
+              <a:solidFill>
+                <a:schemeClr val="tx1"/>
+              </a:solidFill>
+              <a:latin typeface="Aptos Light" panose="020F0502020204030204" pitchFamily="34" charset="0"/>
+            </a:endParaRPr>
+          </a:p>
+          <a:p>
+            <a:pPr algn="ctr"/>
+            <a:endParaRPr lang="en-US" sz="1350" b="1" dirty="0">
+              <a:solidFill>
+                <a:schemeClr val="tx1"/>
+              </a:solidFill>
+              <a:latin typeface="Aptos Light" panose="020F0502020204030204" pitchFamily="34" charset="0"/>
+            </a:endParaRPr>
+          </a:p>
+          <a:p>
+            <a:pPr algn="ctr"/>
+            <a:endParaRPr lang="en-US" sz="1350" b="1" dirty="0">
+              <a:solidFill>
+                <a:schemeClr val="tx1"/>
+              </a:solidFill>
+              <a:latin typeface="Aptos Light" panose="020F0502020204030204" pitchFamily="34" charset="0"/>
+            </a:endParaRPr>
+          </a:p>
+          <a:p>
+            <a:pPr algn="ctr"/>
+            <a:endParaRPr lang="en-US" sz="1350" b="1" dirty="0">
+              <a:solidFill>
+                <a:schemeClr val="tx1"/>
+              </a:solidFill>
+              <a:latin typeface="Aptos Light" panose="020F0502020204030204" pitchFamily="34" charset="0"/>
+            </a:endParaRPr>
+          </a:p>
+          <a:p>
+            <a:pPr algn="ctr"/>
+            <a:endParaRPr lang="en-US" sz="1350" b="1" dirty="0">
+              <a:solidFill>
+                <a:schemeClr val="tx1"/>
+              </a:solidFill>
+              <a:latin typeface="Aptos Light" panose="020F0502020204030204" pitchFamily="34" charset="0"/>
+            </a:endParaRPr>
+          </a:p>
+          <a:p>
+            <a:pPr algn="ctr"/>
+            <a:endParaRPr lang="en-US" sz="1350" b="1" dirty="0">
+              <a:solidFill>
+                <a:schemeClr val="tx1"/>
+              </a:solidFill>
+              <a:latin typeface="Aptos Light" panose="020F0502020204030204" pitchFamily="34" charset="0"/>
+            </a:endParaRPr>
+          </a:p>
+          <a:p>
+            <a:pPr algn="ctr"/>
+            <a:endParaRPr lang="en-US" sz="1350" b="1" dirty="0">
+              <a:solidFill>
+                <a:schemeClr val="tx1"/>
+              </a:solidFill>
+              <a:latin typeface="Aptos Light" panose="020F0502020204030204" pitchFamily="34" charset="0"/>
+            </a:endParaRPr>
+          </a:p>
+          <a:p>
+            <a:pPr algn="ctr"/>
+            <a:endParaRPr lang="en-US" sz="1350" b="1" dirty="0">
+              <a:solidFill>
+                <a:schemeClr val="tx1"/>
+              </a:solidFill>
+              <a:latin typeface="Aptos Light" panose="020F0502020204030204" pitchFamily="34" charset="0"/>
+            </a:endParaRPr>
+          </a:p>
+          <a:p>
+            <a:pPr algn="ctr"/>
+            <a:endParaRPr lang="en-US" sz="1350" b="1" dirty="0">
+              <a:solidFill>
+                <a:schemeClr val="tx1"/>
+              </a:solidFill>
+              <a:latin typeface="Aptos Light" panose="020F0502020204030204" pitchFamily="34" charset="0"/>
+            </a:endParaRPr>
+          </a:p>
+          <a:p>
+            <a:pPr algn="ctr"/>
+            <a:endParaRPr lang="en-US" sz="1350" b="1" dirty="0">
+              <a:solidFill>
+                <a:schemeClr val="tx1"/>
+              </a:solidFill>
+              <a:latin typeface="Aptos Light" panose="020F0502020204030204" pitchFamily="34" charset="0"/>
+            </a:endParaRPr>
+          </a:p>
+          <a:p>
+            <a:pPr algn="ctr"/>
+            <a:endParaRPr lang="en-US" sz="1350" b="1" dirty="0">
+              <a:solidFill>
+                <a:schemeClr val="tx1"/>
+              </a:solidFill>
+              <a:latin typeface="Aptos Light" panose="020F0502020204030204" pitchFamily="34" charset="0"/>
+            </a:endParaRPr>
+          </a:p>
+          <a:p>
+            <a:pPr algn="ctr"/>
+            <a:endParaRPr lang="en-US" sz="1350" b="1" dirty="0">
+              <a:solidFill>
+                <a:schemeClr val="tx1"/>
+              </a:solidFill>
+              <a:latin typeface="Aptos Light" panose="020F0502020204030204" pitchFamily="34" charset="0"/>
+            </a:endParaRPr>
+          </a:p>
+          <a:p>
+            <a:pPr algn="ctr"/>
+            <a:endParaRPr lang="en-US" sz="1350" b="1" dirty="0">
+              <a:solidFill>
+                <a:schemeClr val="tx1"/>
+              </a:solidFill>
+              <a:latin typeface="Aptos Light" panose="020F0502020204030204" pitchFamily="34" charset="0"/>
+            </a:endParaRPr>
+          </a:p>
+          <a:p>
+            <a:pPr algn="ctr"/>
+            <a:endParaRPr lang="en-US" sz="1350" b="1" dirty="0">
+              <a:solidFill>
+                <a:schemeClr val="tx1"/>
+              </a:solidFill>
+              <a:latin typeface="Aptos Light" panose="020F0502020204030204" pitchFamily="34" charset="0"/>
+            </a:endParaRPr>
+          </a:p>
+          <a:p>
+            <a:pPr algn="ctr"/>
+            <a:endParaRPr lang="en-US" sz="1350" b="1" dirty="0">
+              <a:solidFill>
+                <a:schemeClr val="tx1"/>
+              </a:solidFill>
+              <a:latin typeface="Aptos Light" panose="020F0502020204030204" pitchFamily="34" charset="0"/>
+            </a:endParaRPr>
+          </a:p>
+          <a:p>
+            <a:pPr algn="ctr"/>
+            <a:endParaRPr lang="en-US" sz="1350" b="1" dirty="0">
+              <a:solidFill>
+                <a:schemeClr val="tx1"/>
+              </a:solidFill>
+              <a:latin typeface="Aptos Light" panose="020F0502020204030204" pitchFamily="34" charset="0"/>
+            </a:endParaRPr>
+          </a:p>
+        </p:txBody>
+      </p:sp>
+      <p:sp>
+        <p:nvSpPr>
+          <p:cNvPr id="21" name="Rectangle: Rounded Corners 20">
+            <a:extLst>
+              <a:ext uri="{FF2B5EF4-FFF2-40B4-BE49-F238E27FC236}">
+                <a16:creationId xmlns:a16="http://schemas.microsoft.com/office/drawing/2014/main" id="{5A91859D-A593-9C7D-6669-689517B7F383}"/>
+              </a:ext>
+            </a:extLst>
+          </p:cNvPr>
+          <p:cNvSpPr/>
+          <p:nvPr/>
+        </p:nvSpPr>
+        <p:spPr>
+          <a:xfrm>
+            <a:off x="15642668" y="6579508"/>
+            <a:ext cx="1489898" cy="437309"/>
+          </a:xfrm>
+          <a:prstGeom prst="roundRect">
+            <a:avLst/>
+          </a:prstGeom>
+          <a:solidFill>
+            <a:schemeClr val="bg1">
+              <a:lumMod val="85000"/>
+            </a:schemeClr>
+          </a:solidFill>
+        </p:spPr>
+        <p:style>
+          <a:lnRef idx="2">
+            <a:schemeClr val="accent1">
+              <a:shade val="15000"/>
+            </a:schemeClr>
+          </a:lnRef>
+          <a:fillRef idx="1">
+            <a:schemeClr val="accent1"/>
+          </a:fillRef>
+          <a:effectRef idx="0">
+            <a:schemeClr val="accent1"/>
+          </a:effectRef>
+          <a:fontRef idx="minor">
+            <a:schemeClr val="lt1"/>
+          </a:fontRef>
+        </p:style>
+        <p:txBody>
+          <a:bodyPr rtlCol="0" anchor="ctr"/>
+          <a:lstStyle/>
+          <a:p>
+            <a:pPr algn="ctr"/>
+            <a:endParaRPr lang="en-US" sz="1350" b="1" dirty="0">
+              <a:solidFill>
+                <a:schemeClr val="tx1"/>
+              </a:solidFill>
+              <a:latin typeface="Aptos Light" panose="020F0502020204030204" pitchFamily="34" charset="0"/>
+            </a:endParaRPr>
+          </a:p>
+        </p:txBody>
+      </p:sp>
     </p:spTree>
     <p:extLst>
       <p:ext uri="{BB962C8B-B14F-4D97-AF65-F5344CB8AC3E}">

</xml_diff>